<commit_message>
grid search for all model
used loop approch for grid search on all model
</commit_message>
<xml_diff>
--- a/PPT and Synopsis/Minor Project .pptx
+++ b/PPT and Synopsis/Minor Project .pptx
@@ -313,7 +313,7 @@
       </p15:sldGuideLst>
     </p:ext>
     <p:ext uri="http://customooxmlschemas.google.com/">
-      <go:slidesCustomData xmlns="" xmlns:mc="http://schemas.openxmlformats.org/markup-compatibility/2006" xmlns:mv="urn:schemas-microsoft-com:mac:vml" xmlns:c="http://schemas.openxmlformats.org/drawingml/2006/chart" xmlns:dgm="http://schemas.openxmlformats.org/drawingml/2006/diagram" xmlns:o="urn:schemas-microsoft-com:office:office" xmlns:v="urn:schemas-microsoft-com:vml" xmlns:pvml="urn:schemas-microsoft-com:office:powerpoint" xmlns:com="http://schemas.openxmlformats.org/drawingml/2006/compatibility" xmlns:p14="http://schemas.microsoft.com/office/powerpoint/2010/main" xmlns:p15="http://schemas.microsoft.com/office/powerpoint/2012/main" xmlns:ahyp="http://schemas.microsoft.com/office/drawing/2018/hyperlinkcolor" xmlns:go="http://customooxmlschemas.google.com/" r:id="rId46" roundtripDataSignature="AMtx7mj8IhMjdVP7eG8qZUu43+4d3LmxXw=="/>
+      <go:slidesCustomData xmlns:go="http://customooxmlschemas.google.com/" xmlns:ahyp="http://schemas.microsoft.com/office/drawing/2018/hyperlinkcolor" xmlns:p15="http://schemas.microsoft.com/office/powerpoint/2012/main" xmlns:p14="http://schemas.microsoft.com/office/powerpoint/2010/main" xmlns:com="http://schemas.openxmlformats.org/drawingml/2006/compatibility" xmlns:pvml="urn:schemas-microsoft-com:office:powerpoint" xmlns:v="urn:schemas-microsoft-com:vml" xmlns:o="urn:schemas-microsoft-com:office:office" xmlns:dgm="http://schemas.openxmlformats.org/drawingml/2006/diagram" xmlns:c="http://schemas.openxmlformats.org/drawingml/2006/chart" xmlns:mv="urn:schemas-microsoft-com:mac:vml" xmlns:mc="http://schemas.openxmlformats.org/markup-compatibility/2006" xmlns="" r:id="rId46" roundtripDataSignature="AMtx7mj8IhMjdVP7eG8qZUu43+4d3LmxXw=="/>
     </p:ext>
   </p:extLst>
 </p:presentation>
@@ -2694,7 +2694,7 @@
         <a:p>
           <a:r>
             <a:rPr lang="en-US" b="0" i="0" dirty="0"/>
-            <a:t>Improving accuracy using Hyperparameters.</a:t>
+            <a:t>Improving AUC(ROC) using Hyperparameters.</a:t>
           </a:r>
           <a:endParaRPr lang="en-IN" dirty="0"/>
         </a:p>
@@ -2767,10 +2767,10 @@
         <a:lstStyle/>
         <a:p>
           <a:r>
-            <a:rPr lang="en-US" b="0" i="0"/>
+            <a:rPr lang="en-US" b="0" i="0" dirty="0"/>
             <a:t>Save and Load the model</a:t>
           </a:r>
-          <a:endParaRPr lang="en-IN"/>
+          <a:endParaRPr lang="en-IN" dirty="0"/>
         </a:p>
       </dgm:t>
     </dgm:pt>
@@ -2997,7 +2997,7 @@
         <a:p>
           <a:r>
             <a:rPr lang="en-IN" dirty="0"/>
-            <a:t>Loading of dataset </a:t>
+            <a:t>Loading of dataset in K Fold </a:t>
           </a:r>
         </a:p>
       </dgm:t>
@@ -3084,7 +3084,7 @@
 <dgm:dataModel xmlns:dgm="http://schemas.openxmlformats.org/drawingml/2006/diagram" xmlns:a="http://schemas.openxmlformats.org/drawingml/2006/main">
   <dgm:ptLst>
     <dgm:pt modelId="{94F4AA7C-806A-4702-BE2E-9E1DCA2AF040}" type="doc">
-      <dgm:prSet loTypeId="urn:microsoft.com/office/officeart/2005/8/layout/process1" loCatId="process" qsTypeId="urn:microsoft.com/office/officeart/2005/8/quickstyle/simple1" qsCatId="simple" csTypeId="urn:microsoft.com/office/officeart/2005/8/colors/accent1_2" csCatId="accent1"/>
+      <dgm:prSet loTypeId="urn:microsoft.com/office/officeart/2005/8/layout/process1" loCatId="process" qsTypeId="urn:microsoft.com/office/officeart/2005/8/quickstyle/simple1" qsCatId="simple" csTypeId="urn:microsoft.com/office/officeart/2005/8/colors/accent1_2" csCatId="accent1" phldr="1"/>
       <dgm:spPr/>
       <dgm:t>
         <a:bodyPr/>
@@ -3102,10 +3102,10 @@
         <a:lstStyle/>
         <a:p>
           <a:r>
-            <a:rPr lang="en-US" b="0" i="0"/>
-            <a:t>Creating a web app using flask and connecting it with model</a:t>
+            <a:rPr lang="en-US" b="0" i="0" dirty="0"/>
+            <a:t>Creating a web app using flask and connecting it with stored model</a:t>
           </a:r>
-          <a:endParaRPr lang="en-IN"/>
+          <a:endParaRPr lang="en-IN" dirty="0"/>
         </a:p>
       </dgm:t>
     </dgm:pt>
@@ -3300,8 +3300,8 @@
       </dsp:nvSpPr>
       <dsp:spPr>
         <a:xfrm>
-          <a:off x="0" y="1079833"/>
-          <a:ext cx="1940531" cy="1164319"/>
+          <a:off x="0" y="1570196"/>
+          <a:ext cx="1988483" cy="1193090"/>
         </a:xfrm>
         <a:prstGeom prst="roundRect">
           <a:avLst>
@@ -3369,8 +3369,8 @@
         </a:p>
       </dsp:txBody>
       <dsp:txXfrm>
-        <a:off x="34102" y="1113935"/>
-        <a:ext cx="1872327" cy="1096115"/>
+        <a:off x="34944" y="1605140"/>
+        <a:ext cx="1918595" cy="1123202"/>
       </dsp:txXfrm>
     </dsp:sp>
     <dsp:sp modelId="{8EC21265-D3E1-4EFE-AB27-44853506D924}">
@@ -3380,8 +3380,8 @@
       </dsp:nvSpPr>
       <dsp:spPr>
         <a:xfrm>
-          <a:off x="2134585" y="1421367"/>
-          <a:ext cx="411392" cy="481251"/>
+          <a:off x="2187332" y="1920169"/>
+          <a:ext cx="421558" cy="493144"/>
         </a:xfrm>
         <a:prstGeom prst="rightArrow">
           <a:avLst>
@@ -3439,8 +3439,8 @@
         </a:p>
       </dsp:txBody>
       <dsp:txXfrm>
-        <a:off x="2134585" y="1517617"/>
-        <a:ext cx="287974" cy="288751"/>
+        <a:off x="2187332" y="2018798"/>
+        <a:ext cx="295091" cy="295886"/>
       </dsp:txXfrm>
     </dsp:sp>
     <dsp:sp modelId="{50F06E89-BF18-4E5E-BF3B-A8942B167445}">
@@ -3450,8 +3450,8 @@
       </dsp:nvSpPr>
       <dsp:spPr>
         <a:xfrm>
-          <a:off x="2716744" y="1079833"/>
-          <a:ext cx="1940531" cy="1164319"/>
+          <a:off x="2783877" y="1570196"/>
+          <a:ext cx="1988483" cy="1193090"/>
         </a:xfrm>
         <a:prstGeom prst="roundRect">
           <a:avLst>
@@ -3519,8 +3519,8 @@
         </a:p>
       </dsp:txBody>
       <dsp:txXfrm>
-        <a:off x="2750846" y="1113935"/>
-        <a:ext cx="1872327" cy="1096115"/>
+        <a:off x="2818821" y="1605140"/>
+        <a:ext cx="1918595" cy="1123202"/>
       </dsp:txXfrm>
     </dsp:sp>
     <dsp:sp modelId="{38CA247B-B69F-481E-A381-804E7AB32561}">
@@ -3530,8 +3530,8 @@
       </dsp:nvSpPr>
       <dsp:spPr>
         <a:xfrm>
-          <a:off x="4851330" y="1421367"/>
-          <a:ext cx="411392" cy="481251"/>
+          <a:off x="4971209" y="1920169"/>
+          <a:ext cx="421558" cy="493144"/>
         </a:xfrm>
         <a:prstGeom prst="rightArrow">
           <a:avLst>
@@ -3589,8 +3589,8 @@
         </a:p>
       </dsp:txBody>
       <dsp:txXfrm>
-        <a:off x="4851330" y="1517617"/>
-        <a:ext cx="287974" cy="288751"/>
+        <a:off x="4971209" y="2018798"/>
+        <a:ext cx="295091" cy="295886"/>
       </dsp:txXfrm>
     </dsp:sp>
     <dsp:sp modelId="{289918E5-9B7A-4237-B149-F83E0E38A342}">
@@ -3600,8 +3600,8 @@
       </dsp:nvSpPr>
       <dsp:spPr>
         <a:xfrm>
-          <a:off x="5433489" y="1079833"/>
-          <a:ext cx="1940531" cy="1164319"/>
+          <a:off x="5567754" y="1570196"/>
+          <a:ext cx="1988483" cy="1193090"/>
         </a:xfrm>
         <a:prstGeom prst="roundRect">
           <a:avLst>
@@ -3669,8 +3669,8 @@
         </a:p>
       </dsp:txBody>
       <dsp:txXfrm>
-        <a:off x="5467591" y="1113935"/>
-        <a:ext cx="1872327" cy="1096115"/>
+        <a:off x="5602698" y="1605140"/>
+        <a:ext cx="1918595" cy="1123202"/>
       </dsp:txXfrm>
     </dsp:sp>
     <dsp:sp modelId="{EA26C7E6-654E-4039-B040-295A1DA618AF}">
@@ -3680,8 +3680,8 @@
       </dsp:nvSpPr>
       <dsp:spPr>
         <a:xfrm>
-          <a:off x="7568074" y="1421367"/>
-          <a:ext cx="411392" cy="481251"/>
+          <a:off x="7755087" y="1920169"/>
+          <a:ext cx="421558" cy="493144"/>
         </a:xfrm>
         <a:prstGeom prst="rightArrow">
           <a:avLst>
@@ -3739,8 +3739,8 @@
         </a:p>
       </dsp:txBody>
       <dsp:txXfrm>
-        <a:off x="7568074" y="1517617"/>
-        <a:ext cx="287974" cy="288751"/>
+        <a:off x="7755087" y="2018798"/>
+        <a:ext cx="295091" cy="295886"/>
       </dsp:txXfrm>
     </dsp:sp>
     <dsp:sp modelId="{FCB40680-E5AF-44B6-A879-1AA21CEE8CA6}">
@@ -3750,8 +3750,8 @@
       </dsp:nvSpPr>
       <dsp:spPr>
         <a:xfrm>
-          <a:off x="8150234" y="1079833"/>
-          <a:ext cx="1940531" cy="1164319"/>
+          <a:off x="8351632" y="1570196"/>
+          <a:ext cx="1988483" cy="1193090"/>
         </a:xfrm>
         <a:prstGeom prst="roundRect">
           <a:avLst>
@@ -3813,14 +3813,14 @@
           </a:pPr>
           <a:r>
             <a:rPr lang="en-US" sz="1700" b="0" i="0" kern="1200" dirty="0"/>
-            <a:t>Improving accuracy using Hyperparameters.</a:t>
+            <a:t>Improving AUC(ROC) using Hyperparameters.</a:t>
           </a:r>
           <a:endParaRPr lang="en-IN" sz="1700" kern="1200" dirty="0"/>
         </a:p>
       </dsp:txBody>
       <dsp:txXfrm>
-        <a:off x="8184336" y="1113935"/>
-        <a:ext cx="1872327" cy="1096115"/>
+        <a:off x="8386576" y="1605140"/>
+        <a:ext cx="1918595" cy="1123202"/>
       </dsp:txXfrm>
     </dsp:sp>
     <dsp:sp modelId="{EBB27FC3-4842-440E-98C4-3E6A482CFEEF}">
@@ -3830,8 +3830,8 @@
       </dsp:nvSpPr>
       <dsp:spPr>
         <a:xfrm>
-          <a:off x="10284819" y="1421367"/>
-          <a:ext cx="411392" cy="481251"/>
+          <a:off x="10538964" y="1920169"/>
+          <a:ext cx="421558" cy="493144"/>
         </a:xfrm>
         <a:prstGeom prst="rightArrow">
           <a:avLst>
@@ -3889,8 +3889,8 @@
         </a:p>
       </dsp:txBody>
       <dsp:txXfrm>
-        <a:off x="10284819" y="1517617"/>
-        <a:ext cx="287974" cy="288751"/>
+        <a:off x="10538964" y="2018798"/>
+        <a:ext cx="295091" cy="295886"/>
       </dsp:txXfrm>
     </dsp:sp>
     <dsp:sp modelId="{2C973E1E-C167-47CD-B144-4E8CAE3484A3}">
@@ -3900,8 +3900,8 @@
       </dsp:nvSpPr>
       <dsp:spPr>
         <a:xfrm>
-          <a:off x="10866979" y="1079833"/>
-          <a:ext cx="1940531" cy="1164319"/>
+          <a:off x="11135509" y="1570196"/>
+          <a:ext cx="1988483" cy="1193090"/>
         </a:xfrm>
         <a:prstGeom prst="roundRect">
           <a:avLst>
@@ -3969,8 +3969,8 @@
         </a:p>
       </dsp:txBody>
       <dsp:txXfrm>
-        <a:off x="10901081" y="1113935"/>
-        <a:ext cx="1872327" cy="1096115"/>
+        <a:off x="11170453" y="1605140"/>
+        <a:ext cx="1918595" cy="1123202"/>
       </dsp:txXfrm>
     </dsp:sp>
     <dsp:sp modelId="{4E2AB5E2-A927-4E9B-B781-F4814AC74CD5}">
@@ -3980,8 +3980,8 @@
       </dsp:nvSpPr>
       <dsp:spPr>
         <a:xfrm>
-          <a:off x="13001564" y="1421367"/>
-          <a:ext cx="411392" cy="481251"/>
+          <a:off x="13322841" y="1920169"/>
+          <a:ext cx="421558" cy="493144"/>
         </a:xfrm>
         <a:prstGeom prst="rightArrow">
           <a:avLst>
@@ -4039,8 +4039,8 @@
         </a:p>
       </dsp:txBody>
       <dsp:txXfrm>
-        <a:off x="13001564" y="1517617"/>
-        <a:ext cx="287974" cy="288751"/>
+        <a:off x="13322841" y="2018798"/>
+        <a:ext cx="295091" cy="295886"/>
       </dsp:txXfrm>
     </dsp:sp>
     <dsp:sp modelId="{07D1F534-6D1C-449A-860A-C0BA80DB2B88}">
@@ -4050,8 +4050,8 @@
       </dsp:nvSpPr>
       <dsp:spPr>
         <a:xfrm>
-          <a:off x="13583723" y="1079833"/>
-          <a:ext cx="1940531" cy="1164319"/>
+          <a:off x="13919387" y="1570196"/>
+          <a:ext cx="1988483" cy="1193090"/>
         </a:xfrm>
         <a:prstGeom prst="roundRect">
           <a:avLst>
@@ -4112,15 +4112,15 @@
             <a:buNone/>
           </a:pPr>
           <a:r>
-            <a:rPr lang="en-US" sz="1700" b="0" i="0" kern="1200"/>
+            <a:rPr lang="en-US" sz="1700" b="0" i="0" kern="1200" dirty="0"/>
             <a:t>Save and Load the model</a:t>
           </a:r>
-          <a:endParaRPr lang="en-IN" sz="1700" kern="1200"/>
+          <a:endParaRPr lang="en-IN" sz="1700" kern="1200" dirty="0"/>
         </a:p>
       </dsp:txBody>
       <dsp:txXfrm>
-        <a:off x="13617825" y="1113935"/>
-        <a:ext cx="1872327" cy="1096115"/>
+        <a:off x="13954331" y="1605140"/>
+        <a:ext cx="1918595" cy="1123202"/>
       </dsp:txXfrm>
     </dsp:sp>
   </dsp:spTree>
@@ -4142,8 +4142,8 @@
       </dsp:nvSpPr>
       <dsp:spPr>
         <a:xfrm>
-          <a:off x="138247" y="0"/>
-          <a:ext cx="1978503" cy="1099168"/>
+          <a:off x="0" y="0"/>
+          <a:ext cx="2050244" cy="1237970"/>
         </a:xfrm>
         <a:prstGeom prst="roundRect">
           <a:avLst>
@@ -4186,12 +4186,12 @@
         </a:fontRef>
       </dsp:style>
       <dsp:txBody>
-        <a:bodyPr spcFirstLastPara="0" vert="horz" wrap="square" lIns="80010" tIns="80010" rIns="80010" bIns="80010" numCol="1" spcCol="1270" anchor="ctr" anchorCtr="0">
+        <a:bodyPr spcFirstLastPara="0" vert="horz" wrap="square" lIns="83820" tIns="83820" rIns="83820" bIns="83820" numCol="1" spcCol="1270" anchor="ctr" anchorCtr="0">
           <a:noAutofit/>
         </a:bodyPr>
         <a:lstStyle/>
         <a:p>
-          <a:pPr marL="0" lvl="0" indent="0" algn="ctr" defTabSz="933450">
+          <a:pPr marL="0" lvl="0" indent="0" algn="ctr" defTabSz="977900">
             <a:lnSpc>
               <a:spcPct val="90000"/>
             </a:lnSpc>
@@ -4204,14 +4204,14 @@
             <a:buNone/>
           </a:pPr>
           <a:r>
-            <a:rPr lang="en-IN" sz="2100" kern="1200" dirty="0"/>
+            <a:rPr lang="en-IN" sz="2200" kern="1200" dirty="0"/>
             <a:t>Preprocessing of data </a:t>
           </a:r>
         </a:p>
       </dsp:txBody>
       <dsp:txXfrm>
-        <a:off x="170441" y="32194"/>
-        <a:ext cx="1914115" cy="1034780"/>
+        <a:off x="36259" y="36259"/>
+        <a:ext cx="1977726" cy="1165452"/>
       </dsp:txXfrm>
     </dsp:sp>
     <dsp:sp modelId="{64F09196-D8B6-44DD-B781-8F84A1F44EF5}">
@@ -4220,9 +4220,9 @@
         <dsp:cNvSpPr/>
       </dsp:nvSpPr>
       <dsp:spPr>
-        <a:xfrm rot="5428275">
-          <a:off x="919565" y="1120121"/>
-          <a:ext cx="402412" cy="494625"/>
+        <a:xfrm rot="5400000">
+          <a:off x="798515" y="1261569"/>
+          <a:ext cx="453213" cy="557086"/>
         </a:xfrm>
         <a:prstGeom prst="rightArrow">
           <a:avLst>
@@ -4264,7 +4264,7 @@
         </a:bodyPr>
         <a:lstStyle/>
         <a:p>
-          <a:pPr marL="0" lvl="0" indent="0" algn="ctr" defTabSz="755650">
+          <a:pPr marL="0" lvl="0" indent="0" algn="ctr" defTabSz="800100">
             <a:lnSpc>
               <a:spcPct val="90000"/>
             </a:lnSpc>
@@ -4276,12 +4276,12 @@
             </a:spcAft>
             <a:buNone/>
           </a:pPr>
-          <a:endParaRPr lang="en-IN" sz="1700" kern="1200"/>
+          <a:endParaRPr lang="en-IN" sz="1800" kern="1200"/>
         </a:p>
       </dsp:txBody>
       <dsp:txXfrm rot="-5400000">
-        <a:off x="972880" y="1166229"/>
-        <a:ext cx="296775" cy="281688"/>
+        <a:off x="857996" y="1313505"/>
+        <a:ext cx="334252" cy="317249"/>
       </dsp:txXfrm>
     </dsp:sp>
     <dsp:sp modelId="{5780A114-4CEF-491A-A34F-35F6DA086BA3}">
@@ -4291,8 +4291,8 @@
       </dsp:nvSpPr>
       <dsp:spPr>
         <a:xfrm>
-          <a:off x="124793" y="1635700"/>
-          <a:ext cx="1978503" cy="1099168"/>
+          <a:off x="0" y="1842254"/>
+          <a:ext cx="2050244" cy="1237970"/>
         </a:xfrm>
         <a:prstGeom prst="roundRect">
           <a:avLst>
@@ -4335,12 +4335,12 @@
         </a:fontRef>
       </dsp:style>
       <dsp:txBody>
-        <a:bodyPr spcFirstLastPara="0" vert="horz" wrap="square" lIns="80010" tIns="80010" rIns="80010" bIns="80010" numCol="1" spcCol="1270" anchor="ctr" anchorCtr="0">
+        <a:bodyPr spcFirstLastPara="0" vert="horz" wrap="square" lIns="83820" tIns="83820" rIns="83820" bIns="83820" numCol="1" spcCol="1270" anchor="ctr" anchorCtr="0">
           <a:noAutofit/>
         </a:bodyPr>
         <a:lstStyle/>
         <a:p>
-          <a:pPr marL="0" lvl="0" indent="0" algn="ctr" defTabSz="933450">
+          <a:pPr marL="0" lvl="0" indent="0" algn="ctr" defTabSz="977900">
             <a:lnSpc>
               <a:spcPct val="90000"/>
             </a:lnSpc>
@@ -4353,14 +4353,14 @@
             <a:buNone/>
           </a:pPr>
           <a:r>
-            <a:rPr lang="en-IN" sz="2100" kern="1200" dirty="0"/>
-            <a:t>Loading of dataset </a:t>
+            <a:rPr lang="en-IN" sz="2200" kern="1200" dirty="0"/>
+            <a:t>Loading of dataset in K Fold </a:t>
           </a:r>
         </a:p>
       </dsp:txBody>
       <dsp:txXfrm>
-        <a:off x="156987" y="1667894"/>
-        <a:ext cx="1914115" cy="1034780"/>
+        <a:off x="36259" y="1878513"/>
+        <a:ext cx="1977726" cy="1165452"/>
       </dsp:txXfrm>
     </dsp:sp>
   </dsp:spTree>
@@ -4426,12 +4426,12 @@
         </a:fontRef>
       </dsp:style>
       <dsp:txBody>
-        <a:bodyPr spcFirstLastPara="0" vert="horz" wrap="square" lIns="160020" tIns="160020" rIns="160020" bIns="160020" numCol="1" spcCol="1270" anchor="ctr" anchorCtr="0">
+        <a:bodyPr spcFirstLastPara="0" vert="horz" wrap="square" lIns="156210" tIns="156210" rIns="156210" bIns="156210" numCol="1" spcCol="1270" anchor="ctr" anchorCtr="0">
           <a:noAutofit/>
         </a:bodyPr>
         <a:lstStyle/>
         <a:p>
-          <a:pPr marL="0" lvl="0" indent="0" algn="ctr" defTabSz="1866900">
+          <a:pPr marL="0" lvl="0" indent="0" algn="ctr" defTabSz="1822450">
             <a:lnSpc>
               <a:spcPct val="90000"/>
             </a:lnSpc>
@@ -4444,10 +4444,10 @@
             <a:buNone/>
           </a:pPr>
           <a:r>
-            <a:rPr lang="en-US" sz="4200" b="0" i="0" kern="1200"/>
-            <a:t>Creating a web app using flask and connecting it with model</a:t>
+            <a:rPr lang="en-US" sz="4100" b="0" i="0" kern="1200" dirty="0"/>
+            <a:t>Creating a web app using flask and connecting it with stored model</a:t>
           </a:r>
-          <a:endParaRPr lang="en-IN" sz="4200" kern="1200"/>
+          <a:endParaRPr lang="en-IN" sz="4100" kern="1200" dirty="0"/>
         </a:p>
       </dsp:txBody>
       <dsp:txXfrm>
@@ -4505,7 +4505,7 @@
         </a:bodyPr>
         <a:lstStyle/>
         <a:p>
-          <a:pPr marL="0" lvl="0" indent="0" algn="ctr" defTabSz="1511300">
+          <a:pPr marL="0" lvl="0" indent="0" algn="ctr" defTabSz="1466850">
             <a:lnSpc>
               <a:spcPct val="90000"/>
             </a:lnSpc>
@@ -4517,7 +4517,7 @@
             </a:spcAft>
             <a:buNone/>
           </a:pPr>
-          <a:endParaRPr lang="en-IN" sz="3400" kern="1200"/>
+          <a:endParaRPr lang="en-IN" sz="3300" kern="1200"/>
         </a:p>
       </dsp:txBody>
       <dsp:txXfrm>
@@ -4576,12 +4576,12 @@
         </a:fontRef>
       </dsp:style>
       <dsp:txBody>
-        <a:bodyPr spcFirstLastPara="0" vert="horz" wrap="square" lIns="160020" tIns="160020" rIns="160020" bIns="160020" numCol="1" spcCol="1270" anchor="ctr" anchorCtr="0">
+        <a:bodyPr spcFirstLastPara="0" vert="horz" wrap="square" lIns="156210" tIns="156210" rIns="156210" bIns="156210" numCol="1" spcCol="1270" anchor="ctr" anchorCtr="0">
           <a:noAutofit/>
         </a:bodyPr>
         <a:lstStyle/>
         <a:p>
-          <a:pPr marL="0" lvl="0" indent="0" algn="ctr" defTabSz="1866900">
+          <a:pPr marL="0" lvl="0" indent="0" algn="ctr" defTabSz="1822450">
             <a:lnSpc>
               <a:spcPct val="90000"/>
             </a:lnSpc>
@@ -4594,10 +4594,10 @@
             <a:buNone/>
           </a:pPr>
           <a:r>
-            <a:rPr lang="en-US" sz="4200" b="0" i="0" kern="1200"/>
+            <a:rPr lang="en-US" sz="4100" b="0" i="0" kern="1200"/>
             <a:t>Commit project to GitHub</a:t>
           </a:r>
-          <a:endParaRPr lang="en-IN" sz="4200" kern="1200"/>
+          <a:endParaRPr lang="en-IN" sz="4100" kern="1200"/>
         </a:p>
       </dsp:txBody>
       <dsp:txXfrm>
@@ -4655,7 +4655,7 @@
         </a:bodyPr>
         <a:lstStyle/>
         <a:p>
-          <a:pPr marL="0" lvl="0" indent="0" algn="ctr" defTabSz="1511300">
+          <a:pPr marL="0" lvl="0" indent="0" algn="ctr" defTabSz="1466850">
             <a:lnSpc>
               <a:spcPct val="90000"/>
             </a:lnSpc>
@@ -4667,7 +4667,7 @@
             </a:spcAft>
             <a:buNone/>
           </a:pPr>
-          <a:endParaRPr lang="en-IN" sz="3400" kern="1200"/>
+          <a:endParaRPr lang="en-IN" sz="3300" kern="1200"/>
         </a:p>
       </dsp:txBody>
       <dsp:txXfrm>
@@ -4726,12 +4726,12 @@
         </a:fontRef>
       </dsp:style>
       <dsp:txBody>
-        <a:bodyPr spcFirstLastPara="0" vert="horz" wrap="square" lIns="160020" tIns="160020" rIns="160020" bIns="160020" numCol="1" spcCol="1270" anchor="ctr" anchorCtr="0">
+        <a:bodyPr spcFirstLastPara="0" vert="horz" wrap="square" lIns="156210" tIns="156210" rIns="156210" bIns="156210" numCol="1" spcCol="1270" anchor="ctr" anchorCtr="0">
           <a:noAutofit/>
         </a:bodyPr>
         <a:lstStyle/>
         <a:p>
-          <a:pPr marL="0" lvl="0" indent="0" algn="ctr" defTabSz="1866900">
+          <a:pPr marL="0" lvl="0" indent="0" algn="ctr" defTabSz="1822450">
             <a:lnSpc>
               <a:spcPct val="90000"/>
             </a:lnSpc>
@@ -4744,10 +4744,10 @@
             <a:buNone/>
           </a:pPr>
           <a:r>
-            <a:rPr lang="en-US" sz="4200" b="0" i="0" kern="1200"/>
+            <a:rPr lang="en-US" sz="4100" b="0" i="0" kern="1200"/>
             <a:t>Deploy our model using Heroku</a:t>
           </a:r>
-          <a:endParaRPr lang="en-IN" sz="4200" kern="1200"/>
+          <a:endParaRPr lang="en-IN" sz="4100" kern="1200"/>
         </a:p>
       </dsp:txBody>
       <dsp:txXfrm>
@@ -30788,6 +30788,18 @@
               </a:spcAft>
               <a:buNone/>
             </a:pPr>
+            <a:r>
+              <a:rPr lang="en-IN" sz="1800" b="0" i="0" u="none" dirty="0">
+                <a:solidFill>
+                  <a:schemeClr val="dk1"/>
+                </a:solidFill>
+                <a:latin typeface="Calibri"/>
+                <a:ea typeface="Calibri"/>
+                <a:cs typeface="Calibri"/>
+                <a:sym typeface="Calibri"/>
+              </a:rPr>
+              <a:t>S</a:t>
+            </a:r>
             <a:endParaRPr sz="1800" b="0" i="0" u="none" dirty="0">
               <a:solidFill>
                 <a:schemeClr val="dk1"/>
@@ -31625,14 +31637,14 @@
           <p:nvPr>
             <p:extLst>
               <p:ext uri="{D42A27DB-BD31-4B8C-83A1-F6EECF244321}">
-                <p14:modId xmlns:p14="http://schemas.microsoft.com/office/powerpoint/2010/main" val="3373456124"/>
+                <p14:modId xmlns:p14="http://schemas.microsoft.com/office/powerpoint/2010/main" val="1720630903"/>
               </p:ext>
             </p:extLst>
           </p:nvPr>
         </p:nvGraphicFramePr>
         <p:xfrm>
-          <a:off x="1822450" y="5654675"/>
-          <a:ext cx="15524256" cy="3323987"/>
+          <a:off x="1438835" y="4645179"/>
+          <a:ext cx="15907871" cy="4333484"/>
         </p:xfrm>
         <a:graphic>
           <a:graphicData uri="http://schemas.openxmlformats.org/drawingml/2006/diagram">
@@ -31769,14 +31781,14 @@
           <p:nvPr>
             <p:extLst>
               <p:ext uri="{D42A27DB-BD31-4B8C-83A1-F6EECF244321}">
-                <p14:modId xmlns:p14="http://schemas.microsoft.com/office/powerpoint/2010/main" val="3214108274"/>
+                <p14:modId xmlns:p14="http://schemas.microsoft.com/office/powerpoint/2010/main" val="250899419"/>
               </p:ext>
             </p:extLst>
           </p:nvPr>
         </p:nvGraphicFramePr>
         <p:xfrm>
-          <a:off x="4387850" y="5131384"/>
-          <a:ext cx="2254998" cy="2748592"/>
+          <a:off x="4190006" y="4349884"/>
+          <a:ext cx="2050244" cy="3095681"/>
         </p:xfrm>
         <a:graphic>
           <a:graphicData uri="http://schemas.openxmlformats.org/drawingml/2006/diagram">
@@ -31798,8 +31810,8 @@
         </p:nvSpPr>
         <p:spPr>
           <a:xfrm rot="10800000">
-            <a:off x="7972523" y="5897725"/>
-            <a:ext cx="2656716" cy="731520"/>
+            <a:off x="7845187" y="5351880"/>
+            <a:ext cx="2993142" cy="731520"/>
           </a:xfrm>
           <a:prstGeom prst="curvedUpArrow">
             <a:avLst/>
@@ -32794,7 +32806,13 @@
             </a:extLst>
           </p:cNvPr>
           <p:cNvGraphicFramePr/>
-          <p:nvPr/>
+          <p:nvPr>
+            <p:extLst>
+              <p:ext uri="{D42A27DB-BD31-4B8C-83A1-F6EECF244321}">
+                <p14:modId xmlns:p14="http://schemas.microsoft.com/office/powerpoint/2010/main" val="4012571881"/>
+              </p:ext>
+            </p:extLst>
+          </p:nvPr>
         </p:nvGraphicFramePr>
         <p:xfrm>
           <a:off x="1822450" y="2643952"/>

</xml_diff>